<commit_message>
typos in presentation fixed
</commit_message>
<xml_diff>
--- a/Presentation/Exam_presentation.pptx
+++ b/Presentation/Exam_presentation.pptx
@@ -9593,7 +9593,31 @@
                 <a:cs typeface="Comfortaa"/>
                 <a:sym typeface="Comfortaa"/>
               </a:rPr>
-              <a:t>Our metrics could be baised by the task choice!</a:t>
+              <a:t>Our metrics could be </a:t>
+            </a:r>
+            <a:r>
+              <a:rPr lang="it" sz="1800">
+                <a:solidFill>
+                  <a:schemeClr val="lt2"/>
+                </a:solidFill>
+                <a:latin typeface="Comfortaa"/>
+                <a:ea typeface="Comfortaa"/>
+                <a:cs typeface="Comfortaa"/>
+                <a:sym typeface="Comfortaa"/>
+              </a:rPr>
+              <a:t>biased</a:t>
+            </a:r>
+            <a:r>
+              <a:rPr lang="it" sz="1800">
+                <a:solidFill>
+                  <a:schemeClr val="lt2"/>
+                </a:solidFill>
+                <a:latin typeface="Comfortaa"/>
+                <a:ea typeface="Comfortaa"/>
+                <a:cs typeface="Comfortaa"/>
+                <a:sym typeface="Comfortaa"/>
+              </a:rPr>
+              <a:t> by the task choice!</a:t>
             </a:r>
             <a:endParaRPr sz="1800">
               <a:solidFill>
@@ -13274,7 +13298,7 @@
                 <a:cs typeface="Comfortaa"/>
                 <a:sym typeface="Comfortaa"/>
               </a:rPr>
-              <a:t>For each driver predict the if they will DNF (did not finish) a race in the next 1 month</a:t>
+              <a:t>For each driver predict if they will DNF (did not finish) a race in the next 1 month</a:t>
             </a:r>
             <a:endParaRPr sz="1800">
               <a:solidFill>
@@ -14928,6 +14952,285 @@
 </file>
 
 <file path=ppt/theme/theme1.xml><?xml version="1.0" encoding="utf-8"?>
+<a:theme xmlns:a="http://schemas.openxmlformats.org/drawingml/2006/main" xmlns:r="http://schemas.openxmlformats.org/officeDocument/2006/relationships">
+  <a:themeElements>
+    <a:clrScheme name="Default">
+      <a:dk1>
+        <a:srgbClr val="000000"/>
+      </a:dk1>
+      <a:lt1>
+        <a:srgbClr val="FFFFFF"/>
+      </a:lt1>
+      <a:dk2>
+        <a:srgbClr val="158158"/>
+      </a:dk2>
+      <a:lt2>
+        <a:srgbClr val="F3F3F3"/>
+      </a:lt2>
+      <a:accent1>
+        <a:srgbClr val="058DC7"/>
+      </a:accent1>
+      <a:accent2>
+        <a:srgbClr val="50B432"/>
+      </a:accent2>
+      <a:accent3>
+        <a:srgbClr val="ED561B"/>
+      </a:accent3>
+      <a:accent4>
+        <a:srgbClr val="EDEF00"/>
+      </a:accent4>
+      <a:accent5>
+        <a:srgbClr val="24CBE5"/>
+      </a:accent5>
+      <a:accent6>
+        <a:srgbClr val="64E572"/>
+      </a:accent6>
+      <a:hlink>
+        <a:srgbClr val="2200CC"/>
+      </a:hlink>
+      <a:folHlink>
+        <a:srgbClr val="551A8B"/>
+      </a:folHlink>
+    </a:clrScheme>
+    <a:fontScheme name="Office">
+      <a:majorFont>
+        <a:latin typeface="Arial"/>
+        <a:ea typeface=""/>
+        <a:cs typeface=""/>
+        <a:font script="Jpan" typeface="ＭＳ Ｐゴシック"/>
+        <a:font script="Hang" typeface="맑은 고딕"/>
+        <a:font script="Hans" typeface="宋体"/>
+        <a:font script="Hant" typeface="新細明體"/>
+        <a:font script="Arab" typeface="Times New Roman"/>
+        <a:font script="Hebr" typeface="Times New Roman"/>
+        <a:font script="Thai" typeface="Angsana New"/>
+        <a:font script="Ethi" typeface="Nyala"/>
+        <a:font script="Beng" typeface="Vrinda"/>
+        <a:font script="Gujr" typeface="Shruti"/>
+        <a:font script="Khmr" typeface="MoolBoran"/>
+        <a:font script="Knda" typeface="Tunga"/>
+        <a:font script="Guru" typeface="Raavi"/>
+        <a:font script="Cans" typeface="Euphemia"/>
+        <a:font script="Cher" typeface="Plantagenet Cherokee"/>
+        <a:font script="Yiii" typeface="Microsoft Yi Baiti"/>
+        <a:font script="Tibt" typeface="Microsoft Himalaya"/>
+        <a:font script="Thaa" typeface="MV Boli"/>
+        <a:font script="Deva" typeface="Mangal"/>
+        <a:font script="Telu" typeface="Gautami"/>
+        <a:font script="Taml" typeface="Latha"/>
+        <a:font script="Syrc" typeface="Estrangelo Edessa"/>
+        <a:font script="Orya" typeface="Kalinga"/>
+        <a:font script="Mlym" typeface="Kartika"/>
+        <a:font script="Laoo" typeface="DokChampa"/>
+        <a:font script="Sinh" typeface="Iskoola Pota"/>
+        <a:font script="Mong" typeface="Mongolian Baiti"/>
+        <a:font script="Viet" typeface="Times New Roman"/>
+        <a:font script="Uigh" typeface="Microsoft Uighur"/>
+        <a:font script="Geor" typeface="Sylfaen"/>
+      </a:majorFont>
+      <a:minorFont>
+        <a:latin typeface="Arial"/>
+        <a:ea typeface=""/>
+        <a:cs typeface=""/>
+        <a:font script="Jpan" typeface="ＭＳ Ｐゴシック"/>
+        <a:font script="Hang" typeface="맑은 고딕"/>
+        <a:font script="Hans" typeface="宋体"/>
+        <a:font script="Hant" typeface="新細明體"/>
+        <a:font script="Arab" typeface="Arial"/>
+        <a:font script="Hebr" typeface="Arial"/>
+        <a:font script="Thai" typeface="Cordia New"/>
+        <a:font script="Ethi" typeface="Nyala"/>
+        <a:font script="Beng" typeface="Vrinda"/>
+        <a:font script="Gujr" typeface="Shruti"/>
+        <a:font script="Khmr" typeface="DaunPenh"/>
+        <a:font script="Knda" typeface="Tunga"/>
+        <a:font script="Guru" typeface="Raavi"/>
+        <a:font script="Cans" typeface="Euphemia"/>
+        <a:font script="Cher" typeface="Plantagenet Cherokee"/>
+        <a:font script="Yiii" typeface="Microsoft Yi Baiti"/>
+        <a:font script="Tibt" typeface="Microsoft Himalaya"/>
+        <a:font script="Thaa" typeface="MV Boli"/>
+        <a:font script="Deva" typeface="Mangal"/>
+        <a:font script="Telu" typeface="Gautami"/>
+        <a:font script="Taml" typeface="Latha"/>
+        <a:font script="Syrc" typeface="Estrangelo Edessa"/>
+        <a:font script="Orya" typeface="Kalinga"/>
+        <a:font script="Mlym" typeface="Kartika"/>
+        <a:font script="Laoo" typeface="DokChampa"/>
+        <a:font script="Sinh" typeface="Iskoola Pota"/>
+        <a:font script="Mong" typeface="Mongolian Baiti"/>
+        <a:font script="Viet" typeface="Arial"/>
+        <a:font script="Uigh" typeface="Microsoft Uighur"/>
+        <a:font script="Geor" typeface="Sylfaen"/>
+      </a:minorFont>
+    </a:fontScheme>
+    <a:fmtScheme name="Office">
+      <a:fillStyleLst>
+        <a:solidFill>
+          <a:schemeClr val="phClr"/>
+        </a:solidFill>
+        <a:gradFill rotWithShape="1">
+          <a:gsLst>
+            <a:gs pos="0">
+              <a:schemeClr val="phClr">
+                <a:tint val="50000"/>
+                <a:satMod val="300000"/>
+              </a:schemeClr>
+            </a:gs>
+            <a:gs pos="35000">
+              <a:schemeClr val="phClr">
+                <a:tint val="37000"/>
+                <a:satMod val="300000"/>
+              </a:schemeClr>
+            </a:gs>
+            <a:gs pos="100000">
+              <a:schemeClr val="phClr">
+                <a:tint val="15000"/>
+                <a:satMod val="350000"/>
+              </a:schemeClr>
+            </a:gs>
+          </a:gsLst>
+          <a:lin ang="16200000" scaled="1"/>
+        </a:gradFill>
+        <a:gradFill rotWithShape="1">
+          <a:gsLst>
+            <a:gs pos="0">
+              <a:schemeClr val="phClr">
+                <a:tint val="100000"/>
+                <a:shade val="100000"/>
+                <a:satMod val="130000"/>
+              </a:schemeClr>
+            </a:gs>
+            <a:gs pos="100000">
+              <a:schemeClr val="phClr">
+                <a:tint val="50000"/>
+                <a:shade val="100000"/>
+                <a:satMod val="350000"/>
+              </a:schemeClr>
+            </a:gs>
+          </a:gsLst>
+          <a:lin ang="16200000" scaled="0"/>
+        </a:gradFill>
+      </a:fillStyleLst>
+      <a:lnStyleLst>
+        <a:ln w="9525" cap="flat" cmpd="sng" algn="ctr">
+          <a:solidFill>
+            <a:schemeClr val="phClr">
+              <a:shade val="95000"/>
+              <a:satMod val="105000"/>
+            </a:schemeClr>
+          </a:solidFill>
+          <a:prstDash val="solid"/>
+        </a:ln>
+        <a:ln w="25400" cap="flat" cmpd="sng" algn="ctr">
+          <a:solidFill>
+            <a:schemeClr val="phClr"/>
+          </a:solidFill>
+          <a:prstDash val="solid"/>
+        </a:ln>
+        <a:ln w="38100" cap="flat" cmpd="sng" algn="ctr">
+          <a:solidFill>
+            <a:schemeClr val="phClr"/>
+          </a:solidFill>
+          <a:prstDash val="solid"/>
+        </a:ln>
+      </a:lnStyleLst>
+      <a:effectStyleLst>
+        <a:effectStyle>
+          <a:effectLst>
+            <a:outerShdw blurRad="40000" dist="20000" dir="5400000" rotWithShape="0">
+              <a:srgbClr val="000000">
+                <a:alpha val="38000"/>
+              </a:srgbClr>
+            </a:outerShdw>
+          </a:effectLst>
+        </a:effectStyle>
+        <a:effectStyle>
+          <a:effectLst>
+            <a:outerShdw blurRad="40000" dist="23000" dir="5400000" rotWithShape="0">
+              <a:srgbClr val="000000">
+                <a:alpha val="35000"/>
+              </a:srgbClr>
+            </a:outerShdw>
+          </a:effectLst>
+        </a:effectStyle>
+        <a:effectStyle>
+          <a:effectLst>
+            <a:outerShdw blurRad="40000" dist="23000" dir="5400000" rotWithShape="0">
+              <a:srgbClr val="000000">
+                <a:alpha val="35000"/>
+              </a:srgbClr>
+            </a:outerShdw>
+          </a:effectLst>
+          <a:scene3d>
+            <a:camera prst="orthographicFront">
+              <a:rot lat="0" lon="0" rev="0"/>
+            </a:camera>
+            <a:lightRig rig="threePt" dir="t">
+              <a:rot lat="0" lon="0" rev="1200000"/>
+            </a:lightRig>
+          </a:scene3d>
+          <a:sp3d>
+            <a:bevelT w="63500" h="25400"/>
+          </a:sp3d>
+        </a:effectStyle>
+      </a:effectStyleLst>
+      <a:bgFillStyleLst>
+        <a:solidFill>
+          <a:schemeClr val="phClr"/>
+        </a:solidFill>
+        <a:gradFill rotWithShape="1">
+          <a:gsLst>
+            <a:gs pos="0">
+              <a:schemeClr val="phClr">
+                <a:tint val="40000"/>
+                <a:satMod val="350000"/>
+              </a:schemeClr>
+            </a:gs>
+            <a:gs pos="40000">
+              <a:schemeClr val="phClr">
+                <a:tint val="45000"/>
+                <a:shade val="99000"/>
+                <a:satMod val="350000"/>
+              </a:schemeClr>
+            </a:gs>
+            <a:gs pos="100000">
+              <a:schemeClr val="phClr">
+                <a:shade val="20000"/>
+                <a:satMod val="255000"/>
+              </a:schemeClr>
+            </a:gs>
+          </a:gsLst>
+          <a:path path="circle">
+            <a:fillToRect l="50000" t="-80000" r="50000" b="180000"/>
+          </a:path>
+        </a:gradFill>
+        <a:gradFill rotWithShape="1">
+          <a:gsLst>
+            <a:gs pos="0">
+              <a:schemeClr val="phClr">
+                <a:tint val="80000"/>
+                <a:satMod val="300000"/>
+              </a:schemeClr>
+            </a:gs>
+            <a:gs pos="100000">
+              <a:schemeClr val="phClr">
+                <a:shade val="30000"/>
+                <a:satMod val="200000"/>
+              </a:schemeClr>
+            </a:gs>
+          </a:gsLst>
+          <a:path path="circle">
+            <a:fillToRect l="50000" t="50000" r="50000" b="50000"/>
+          </a:path>
+        </a:gradFill>
+      </a:bgFillStyleLst>
+    </a:fmtScheme>
+  </a:themeElements>
+</a:theme>
+</file>
+
+<file path=ppt/theme/theme2.xml><?xml version="1.0" encoding="utf-8"?>
 <a:theme xmlns:a="http://schemas.openxmlformats.org/drawingml/2006/main" xmlns:r="http://schemas.openxmlformats.org/officeDocument/2006/relationships" name="Simple Dark">
   <a:themeElements>
     <a:clrScheme name="Simple Dark">
@@ -15204,283 +15507,4 @@
     </a:fmtScheme>
   </a:themeElements>
 </a:theme>
-</file>
-
-<file path=ppt/theme/theme2.xml><?xml version="1.0" encoding="utf-8"?>
-<a:theme xmlns:a="http://schemas.openxmlformats.org/drawingml/2006/main" xmlns:r="http://schemas.openxmlformats.org/officeDocument/2006/relationships">
-  <a:themeElements>
-    <a:clrScheme name="Default">
-      <a:dk1>
-        <a:srgbClr val="000000"/>
-      </a:dk1>
-      <a:lt1>
-        <a:srgbClr val="FFFFFF"/>
-      </a:lt1>
-      <a:dk2>
-        <a:srgbClr val="158158"/>
-      </a:dk2>
-      <a:lt2>
-        <a:srgbClr val="F3F3F3"/>
-      </a:lt2>
-      <a:accent1>
-        <a:srgbClr val="058DC7"/>
-      </a:accent1>
-      <a:accent2>
-        <a:srgbClr val="50B432"/>
-      </a:accent2>
-      <a:accent3>
-        <a:srgbClr val="ED561B"/>
-      </a:accent3>
-      <a:accent4>
-        <a:srgbClr val="EDEF00"/>
-      </a:accent4>
-      <a:accent5>
-        <a:srgbClr val="24CBE5"/>
-      </a:accent5>
-      <a:accent6>
-        <a:srgbClr val="64E572"/>
-      </a:accent6>
-      <a:hlink>
-        <a:srgbClr val="2200CC"/>
-      </a:hlink>
-      <a:folHlink>
-        <a:srgbClr val="551A8B"/>
-      </a:folHlink>
-    </a:clrScheme>
-    <a:fontScheme name="Office">
-      <a:majorFont>
-        <a:latin typeface="Arial"/>
-        <a:ea typeface=""/>
-        <a:cs typeface=""/>
-        <a:font script="Jpan" typeface="ＭＳ Ｐゴシック"/>
-        <a:font script="Hang" typeface="맑은 고딕"/>
-        <a:font script="Hans" typeface="宋体"/>
-        <a:font script="Hant" typeface="新細明體"/>
-        <a:font script="Arab" typeface="Times New Roman"/>
-        <a:font script="Hebr" typeface="Times New Roman"/>
-        <a:font script="Thai" typeface="Angsana New"/>
-        <a:font script="Ethi" typeface="Nyala"/>
-        <a:font script="Beng" typeface="Vrinda"/>
-        <a:font script="Gujr" typeface="Shruti"/>
-        <a:font script="Khmr" typeface="MoolBoran"/>
-        <a:font script="Knda" typeface="Tunga"/>
-        <a:font script="Guru" typeface="Raavi"/>
-        <a:font script="Cans" typeface="Euphemia"/>
-        <a:font script="Cher" typeface="Plantagenet Cherokee"/>
-        <a:font script="Yiii" typeface="Microsoft Yi Baiti"/>
-        <a:font script="Tibt" typeface="Microsoft Himalaya"/>
-        <a:font script="Thaa" typeface="MV Boli"/>
-        <a:font script="Deva" typeface="Mangal"/>
-        <a:font script="Telu" typeface="Gautami"/>
-        <a:font script="Taml" typeface="Latha"/>
-        <a:font script="Syrc" typeface="Estrangelo Edessa"/>
-        <a:font script="Orya" typeface="Kalinga"/>
-        <a:font script="Mlym" typeface="Kartika"/>
-        <a:font script="Laoo" typeface="DokChampa"/>
-        <a:font script="Sinh" typeface="Iskoola Pota"/>
-        <a:font script="Mong" typeface="Mongolian Baiti"/>
-        <a:font script="Viet" typeface="Times New Roman"/>
-        <a:font script="Uigh" typeface="Microsoft Uighur"/>
-        <a:font script="Geor" typeface="Sylfaen"/>
-      </a:majorFont>
-      <a:minorFont>
-        <a:latin typeface="Arial"/>
-        <a:ea typeface=""/>
-        <a:cs typeface=""/>
-        <a:font script="Jpan" typeface="ＭＳ Ｐゴシック"/>
-        <a:font script="Hang" typeface="맑은 고딕"/>
-        <a:font script="Hans" typeface="宋体"/>
-        <a:font script="Hant" typeface="新細明體"/>
-        <a:font script="Arab" typeface="Arial"/>
-        <a:font script="Hebr" typeface="Arial"/>
-        <a:font script="Thai" typeface="Cordia New"/>
-        <a:font script="Ethi" typeface="Nyala"/>
-        <a:font script="Beng" typeface="Vrinda"/>
-        <a:font script="Gujr" typeface="Shruti"/>
-        <a:font script="Khmr" typeface="DaunPenh"/>
-        <a:font script="Knda" typeface="Tunga"/>
-        <a:font script="Guru" typeface="Raavi"/>
-        <a:font script="Cans" typeface="Euphemia"/>
-        <a:font script="Cher" typeface="Plantagenet Cherokee"/>
-        <a:font script="Yiii" typeface="Microsoft Yi Baiti"/>
-        <a:font script="Tibt" typeface="Microsoft Himalaya"/>
-        <a:font script="Thaa" typeface="MV Boli"/>
-        <a:font script="Deva" typeface="Mangal"/>
-        <a:font script="Telu" typeface="Gautami"/>
-        <a:font script="Taml" typeface="Latha"/>
-        <a:font script="Syrc" typeface="Estrangelo Edessa"/>
-        <a:font script="Orya" typeface="Kalinga"/>
-        <a:font script="Mlym" typeface="Kartika"/>
-        <a:font script="Laoo" typeface="DokChampa"/>
-        <a:font script="Sinh" typeface="Iskoola Pota"/>
-        <a:font script="Mong" typeface="Mongolian Baiti"/>
-        <a:font script="Viet" typeface="Arial"/>
-        <a:font script="Uigh" typeface="Microsoft Uighur"/>
-        <a:font script="Geor" typeface="Sylfaen"/>
-      </a:minorFont>
-    </a:fontScheme>
-    <a:fmtScheme name="Office">
-      <a:fillStyleLst>
-        <a:solidFill>
-          <a:schemeClr val="phClr"/>
-        </a:solidFill>
-        <a:gradFill rotWithShape="1">
-          <a:gsLst>
-            <a:gs pos="0">
-              <a:schemeClr val="phClr">
-                <a:tint val="50000"/>
-                <a:satMod val="300000"/>
-              </a:schemeClr>
-            </a:gs>
-            <a:gs pos="35000">
-              <a:schemeClr val="phClr">
-                <a:tint val="37000"/>
-                <a:satMod val="300000"/>
-              </a:schemeClr>
-            </a:gs>
-            <a:gs pos="100000">
-              <a:schemeClr val="phClr">
-                <a:tint val="15000"/>
-                <a:satMod val="350000"/>
-              </a:schemeClr>
-            </a:gs>
-          </a:gsLst>
-          <a:lin ang="16200000" scaled="1"/>
-        </a:gradFill>
-        <a:gradFill rotWithShape="1">
-          <a:gsLst>
-            <a:gs pos="0">
-              <a:schemeClr val="phClr">
-                <a:tint val="100000"/>
-                <a:shade val="100000"/>
-                <a:satMod val="130000"/>
-              </a:schemeClr>
-            </a:gs>
-            <a:gs pos="100000">
-              <a:schemeClr val="phClr">
-                <a:tint val="50000"/>
-                <a:shade val="100000"/>
-                <a:satMod val="350000"/>
-              </a:schemeClr>
-            </a:gs>
-          </a:gsLst>
-          <a:lin ang="16200000" scaled="0"/>
-        </a:gradFill>
-      </a:fillStyleLst>
-      <a:lnStyleLst>
-        <a:ln w="9525" cap="flat" cmpd="sng" algn="ctr">
-          <a:solidFill>
-            <a:schemeClr val="phClr">
-              <a:shade val="95000"/>
-              <a:satMod val="105000"/>
-            </a:schemeClr>
-          </a:solidFill>
-          <a:prstDash val="solid"/>
-        </a:ln>
-        <a:ln w="25400" cap="flat" cmpd="sng" algn="ctr">
-          <a:solidFill>
-            <a:schemeClr val="phClr"/>
-          </a:solidFill>
-          <a:prstDash val="solid"/>
-        </a:ln>
-        <a:ln w="38100" cap="flat" cmpd="sng" algn="ctr">
-          <a:solidFill>
-            <a:schemeClr val="phClr"/>
-          </a:solidFill>
-          <a:prstDash val="solid"/>
-        </a:ln>
-      </a:lnStyleLst>
-      <a:effectStyleLst>
-        <a:effectStyle>
-          <a:effectLst>
-            <a:outerShdw blurRad="40000" dist="20000" dir="5400000" rotWithShape="0">
-              <a:srgbClr val="000000">
-                <a:alpha val="38000"/>
-              </a:srgbClr>
-            </a:outerShdw>
-          </a:effectLst>
-        </a:effectStyle>
-        <a:effectStyle>
-          <a:effectLst>
-            <a:outerShdw blurRad="40000" dist="23000" dir="5400000" rotWithShape="0">
-              <a:srgbClr val="000000">
-                <a:alpha val="35000"/>
-              </a:srgbClr>
-            </a:outerShdw>
-          </a:effectLst>
-        </a:effectStyle>
-        <a:effectStyle>
-          <a:effectLst>
-            <a:outerShdw blurRad="40000" dist="23000" dir="5400000" rotWithShape="0">
-              <a:srgbClr val="000000">
-                <a:alpha val="35000"/>
-              </a:srgbClr>
-            </a:outerShdw>
-          </a:effectLst>
-          <a:scene3d>
-            <a:camera prst="orthographicFront">
-              <a:rot lat="0" lon="0" rev="0"/>
-            </a:camera>
-            <a:lightRig rig="threePt" dir="t">
-              <a:rot lat="0" lon="0" rev="1200000"/>
-            </a:lightRig>
-          </a:scene3d>
-          <a:sp3d>
-            <a:bevelT w="63500" h="25400"/>
-          </a:sp3d>
-        </a:effectStyle>
-      </a:effectStyleLst>
-      <a:bgFillStyleLst>
-        <a:solidFill>
-          <a:schemeClr val="phClr"/>
-        </a:solidFill>
-        <a:gradFill rotWithShape="1">
-          <a:gsLst>
-            <a:gs pos="0">
-              <a:schemeClr val="phClr">
-                <a:tint val="40000"/>
-                <a:satMod val="350000"/>
-              </a:schemeClr>
-            </a:gs>
-            <a:gs pos="40000">
-              <a:schemeClr val="phClr">
-                <a:tint val="45000"/>
-                <a:shade val="99000"/>
-                <a:satMod val="350000"/>
-              </a:schemeClr>
-            </a:gs>
-            <a:gs pos="100000">
-              <a:schemeClr val="phClr">
-                <a:shade val="20000"/>
-                <a:satMod val="255000"/>
-              </a:schemeClr>
-            </a:gs>
-          </a:gsLst>
-          <a:path path="circle">
-            <a:fillToRect l="50000" t="-80000" r="50000" b="180000"/>
-          </a:path>
-        </a:gradFill>
-        <a:gradFill rotWithShape="1">
-          <a:gsLst>
-            <a:gs pos="0">
-              <a:schemeClr val="phClr">
-                <a:tint val="80000"/>
-                <a:satMod val="300000"/>
-              </a:schemeClr>
-            </a:gs>
-            <a:gs pos="100000">
-              <a:schemeClr val="phClr">
-                <a:shade val="30000"/>
-                <a:satMod val="200000"/>
-              </a:schemeClr>
-            </a:gs>
-          </a:gsLst>
-          <a:path path="circle">
-            <a:fillToRect l="50000" t="50000" r="50000" b="50000"/>
-          </a:path>
-        </a:gradFill>
-      </a:bgFillStyleLst>
-    </a:fmtScheme>
-  </a:themeElements>
-</a:theme>
 </file>
</xml_diff>

<commit_message>
updated the exam presentation
</commit_message>
<xml_diff>
--- a/Presentation/Exam_presentation.pptx
+++ b/Presentation/Exam_presentation.pptx
@@ -25,14 +25,16 @@
     <p:sldId id="270" r:id="rId20"/>
     <p:sldId id="271" r:id="rId21"/>
     <p:sldId id="272" r:id="rId22"/>
+    <p:sldId id="273" r:id="rId23"/>
+    <p:sldId id="274" r:id="rId24"/>
   </p:sldIdLst>
   <p:sldSz cy="5143500" cx="9144000"/>
   <p:notesSz cx="6858000" cy="9144000"/>
   <p:embeddedFontLst>
     <p:embeddedFont>
       <p:font typeface="Comfortaa"/>
-      <p:regular r:id="rId23"/>
-      <p:bold r:id="rId24"/>
+      <p:regular r:id="rId25"/>
+      <p:bold r:id="rId26"/>
     </p:embeddedFont>
   </p:embeddedFontLst>
   <p:defaultTextStyle>
@@ -1322,7 +1324,7 @@
       </p:grpSpPr>
       <p:sp>
         <p:nvSpPr>
-          <p:cNvPr id="174" name="Google Shape;174;g33f21b84584_0_159:notes"/>
+          <p:cNvPr id="174" name="Google Shape;174;g342f6485df5_0_7:notes"/>
           <p:cNvSpPr/>
           <p:nvPr>
             <p:ph idx="2" type="sldImg"/>
@@ -1357,7 +1359,7 @@
       </p:sp>
       <p:sp>
         <p:nvSpPr>
-          <p:cNvPr id="175" name="Google Shape;175;g33f21b84584_0_159:notes"/>
+          <p:cNvPr id="175" name="Google Shape;175;g342f6485df5_0_7:notes"/>
           <p:cNvSpPr txBox="1"/>
           <p:nvPr>
             <p:ph idx="1" type="body"/>
@@ -1421,7 +1423,7 @@
       </p:grpSpPr>
       <p:sp>
         <p:nvSpPr>
-          <p:cNvPr id="181" name="Google Shape;181;g33f21b84584_0_165:notes"/>
+          <p:cNvPr id="181" name="Google Shape;181;g342f6485df5_0_1:notes"/>
           <p:cNvSpPr/>
           <p:nvPr>
             <p:ph idx="2" type="sldImg"/>
@@ -1456,7 +1458,7 @@
       </p:sp>
       <p:sp>
         <p:nvSpPr>
-          <p:cNvPr id="182" name="Google Shape;182;g33f21b84584_0_165:notes"/>
+          <p:cNvPr id="182" name="Google Shape;182;g342f6485df5_0_1:notes"/>
           <p:cNvSpPr txBox="1"/>
           <p:nvPr>
             <p:ph idx="1" type="body"/>
@@ -1506,7 +1508,7 @@
   <p:cSld>
     <p:spTree>
       <p:nvGrpSpPr>
-        <p:cNvPr id="190" name="Shape 190"/>
+        <p:cNvPr id="187" name="Shape 187"/>
         <p:cNvGrpSpPr/>
         <p:nvPr/>
       </p:nvGrpSpPr>
@@ -1520,7 +1522,7 @@
       </p:grpSpPr>
       <p:sp>
         <p:nvSpPr>
-          <p:cNvPr id="191" name="Google Shape;191;g33f21b84584_0_174:notes"/>
+          <p:cNvPr id="188" name="Google Shape;188;g33f21b84584_0_159:notes"/>
           <p:cNvSpPr/>
           <p:nvPr>
             <p:ph idx="2" type="sldImg"/>
@@ -1555,7 +1557,205 @@
       </p:sp>
       <p:sp>
         <p:nvSpPr>
-          <p:cNvPr id="192" name="Google Shape;192;g33f21b84584_0_174:notes"/>
+          <p:cNvPr id="189" name="Google Shape;189;g33f21b84584_0_159:notes"/>
+          <p:cNvSpPr txBox="1"/>
+          <p:nvPr>
+            <p:ph idx="1" type="body"/>
+          </p:nvPr>
+        </p:nvSpPr>
+        <p:spPr>
+          <a:xfrm>
+            <a:off x="685800" y="4343400"/>
+            <a:ext cx="5486400" cy="4114800"/>
+          </a:xfrm>
+          <a:prstGeom prst="rect">
+            <a:avLst/>
+          </a:prstGeom>
+        </p:spPr>
+        <p:txBody>
+          <a:bodyPr anchorCtr="0" anchor="t" bIns="91425" lIns="91425" spcFirstLastPara="1" rIns="91425" wrap="square" tIns="91425">
+            <a:noAutofit/>
+          </a:bodyPr>
+          <a:lstStyle/>
+          <a:p>
+            <a:pPr indent="0" lvl="0" marL="0" rtl="0" algn="l">
+              <a:spcBef>
+                <a:spcPts val="0"/>
+              </a:spcBef>
+              <a:spcAft>
+                <a:spcPts val="0"/>
+              </a:spcAft>
+              <a:buNone/>
+            </a:pPr>
+            <a:r>
+              <a:t/>
+            </a:r>
+            <a:endParaRPr/>
+          </a:p>
+        </p:txBody>
+      </p:sp>
+    </p:spTree>
+  </p:cSld>
+  <p:clrMapOvr>
+    <a:masterClrMapping/>
+  </p:clrMapOvr>
+</p:notes>
+</file>
+
+<file path=ppt/notesSlides/notesSlide18.xml><?xml version="1.0" encoding="utf-8"?>
+<p:notes xmlns:a="http://schemas.openxmlformats.org/drawingml/2006/main" xmlns:r="http://schemas.openxmlformats.org/officeDocument/2006/relationships" xmlns:mc="http://schemas.openxmlformats.org/markup-compatibility/2006" xmlns:mv="urn:schemas-microsoft-com:mac:vml" xmlns:p="http://schemas.openxmlformats.org/presentationml/2006/main" xmlns:c="http://schemas.openxmlformats.org/drawingml/2006/chart" xmlns:dgm="http://schemas.openxmlformats.org/drawingml/2006/diagram" xmlns:o="urn:schemas-microsoft-com:office:office" xmlns:v="urn:schemas-microsoft-com:vml" xmlns:pvml="urn:schemas-microsoft-com:office:powerpoint" xmlns:com="http://schemas.openxmlformats.org/drawingml/2006/compatibility" xmlns:p14="http://schemas.microsoft.com/office/powerpoint/2010/main" xmlns:p15="http://schemas.microsoft.com/office/powerpoint/2012/main" xmlns:ahyp="http://schemas.microsoft.com/office/drawing/2018/hyperlinkcolor" showMasterPhAnim="0" showMasterSp="0">
+  <p:cSld>
+    <p:spTree>
+      <p:nvGrpSpPr>
+        <p:cNvPr id="194" name="Shape 194"/>
+        <p:cNvGrpSpPr/>
+        <p:nvPr/>
+      </p:nvGrpSpPr>
+      <p:grpSpPr>
+        <a:xfrm>
+          <a:off x="0" y="0"/>
+          <a:ext cx="0" cy="0"/>
+          <a:chOff x="0" y="0"/>
+          <a:chExt cx="0" cy="0"/>
+        </a:xfrm>
+      </p:grpSpPr>
+      <p:sp>
+        <p:nvSpPr>
+          <p:cNvPr id="195" name="Google Shape;195;g33f21b84584_0_165:notes"/>
+          <p:cNvSpPr/>
+          <p:nvPr>
+            <p:ph idx="2" type="sldImg"/>
+          </p:nvPr>
+        </p:nvSpPr>
+        <p:spPr>
+          <a:xfrm>
+            <a:off x="381300" y="685800"/>
+            <a:ext cx="6096000" cy="3429000"/>
+          </a:xfrm>
+          <a:custGeom>
+            <a:rect b="b" l="l" r="r" t="t"/>
+            <a:pathLst>
+              <a:path extrusionOk="0" h="120000" w="120000">
+                <a:moveTo>
+                  <a:pt x="0" y="0"/>
+                </a:moveTo>
+                <a:lnTo>
+                  <a:pt x="120000" y="0"/>
+                </a:lnTo>
+                <a:lnTo>
+                  <a:pt x="120000" y="120000"/>
+                </a:lnTo>
+                <a:lnTo>
+                  <a:pt x="0" y="120000"/>
+                </a:lnTo>
+                <a:close/>
+              </a:path>
+            </a:pathLst>
+          </a:custGeom>
+        </p:spPr>
+      </p:sp>
+      <p:sp>
+        <p:nvSpPr>
+          <p:cNvPr id="196" name="Google Shape;196;g33f21b84584_0_165:notes"/>
+          <p:cNvSpPr txBox="1"/>
+          <p:nvPr>
+            <p:ph idx="1" type="body"/>
+          </p:nvPr>
+        </p:nvSpPr>
+        <p:spPr>
+          <a:xfrm>
+            <a:off x="685800" y="4343400"/>
+            <a:ext cx="5486400" cy="4114800"/>
+          </a:xfrm>
+          <a:prstGeom prst="rect">
+            <a:avLst/>
+          </a:prstGeom>
+        </p:spPr>
+        <p:txBody>
+          <a:bodyPr anchorCtr="0" anchor="t" bIns="91425" lIns="91425" spcFirstLastPara="1" rIns="91425" wrap="square" tIns="91425">
+            <a:noAutofit/>
+          </a:bodyPr>
+          <a:lstStyle/>
+          <a:p>
+            <a:pPr indent="0" lvl="0" marL="0" rtl="0" algn="l">
+              <a:spcBef>
+                <a:spcPts val="0"/>
+              </a:spcBef>
+              <a:spcAft>
+                <a:spcPts val="0"/>
+              </a:spcAft>
+              <a:buNone/>
+            </a:pPr>
+            <a:r>
+              <a:t/>
+            </a:r>
+            <a:endParaRPr/>
+          </a:p>
+        </p:txBody>
+      </p:sp>
+    </p:spTree>
+  </p:cSld>
+  <p:clrMapOvr>
+    <a:masterClrMapping/>
+  </p:clrMapOvr>
+</p:notes>
+</file>
+
+<file path=ppt/notesSlides/notesSlide19.xml><?xml version="1.0" encoding="utf-8"?>
+<p:notes xmlns:a="http://schemas.openxmlformats.org/drawingml/2006/main" xmlns:r="http://schemas.openxmlformats.org/officeDocument/2006/relationships" xmlns:mc="http://schemas.openxmlformats.org/markup-compatibility/2006" xmlns:mv="urn:schemas-microsoft-com:mac:vml" xmlns:p="http://schemas.openxmlformats.org/presentationml/2006/main" xmlns:c="http://schemas.openxmlformats.org/drawingml/2006/chart" xmlns:dgm="http://schemas.openxmlformats.org/drawingml/2006/diagram" xmlns:o="urn:schemas-microsoft-com:office:office" xmlns:v="urn:schemas-microsoft-com:vml" xmlns:pvml="urn:schemas-microsoft-com:office:powerpoint" xmlns:com="http://schemas.openxmlformats.org/drawingml/2006/compatibility" xmlns:p14="http://schemas.microsoft.com/office/powerpoint/2010/main" xmlns:p15="http://schemas.microsoft.com/office/powerpoint/2012/main" xmlns:ahyp="http://schemas.microsoft.com/office/drawing/2018/hyperlinkcolor" showMasterPhAnim="0" showMasterSp="0">
+  <p:cSld>
+    <p:spTree>
+      <p:nvGrpSpPr>
+        <p:cNvPr id="204" name="Shape 204"/>
+        <p:cNvGrpSpPr/>
+        <p:nvPr/>
+      </p:nvGrpSpPr>
+      <p:grpSpPr>
+        <a:xfrm>
+          <a:off x="0" y="0"/>
+          <a:ext cx="0" cy="0"/>
+          <a:chOff x="0" y="0"/>
+          <a:chExt cx="0" cy="0"/>
+        </a:xfrm>
+      </p:grpSpPr>
+      <p:sp>
+        <p:nvSpPr>
+          <p:cNvPr id="205" name="Google Shape;205;g33f21b84584_0_174:notes"/>
+          <p:cNvSpPr/>
+          <p:nvPr>
+            <p:ph idx="2" type="sldImg"/>
+          </p:nvPr>
+        </p:nvSpPr>
+        <p:spPr>
+          <a:xfrm>
+            <a:off x="381300" y="685800"/>
+            <a:ext cx="6096000" cy="3429000"/>
+          </a:xfrm>
+          <a:custGeom>
+            <a:rect b="b" l="l" r="r" t="t"/>
+            <a:pathLst>
+              <a:path extrusionOk="0" h="120000" w="120000">
+                <a:moveTo>
+                  <a:pt x="0" y="0"/>
+                </a:moveTo>
+                <a:lnTo>
+                  <a:pt x="120000" y="0"/>
+                </a:lnTo>
+                <a:lnTo>
+                  <a:pt x="120000" y="120000"/>
+                </a:lnTo>
+                <a:lnTo>
+                  <a:pt x="0" y="120000"/>
+                </a:lnTo>
+                <a:close/>
+              </a:path>
+            </a:pathLst>
+          </a:custGeom>
+        </p:spPr>
+      </p:sp>
+      <p:sp>
+        <p:nvSpPr>
+          <p:cNvPr id="206" name="Google Shape;206;g33f21b84584_0_174:notes"/>
           <p:cNvSpPr txBox="1"/>
           <p:nvPr>
             <p:ph idx="1" type="body"/>
@@ -8925,7 +9125,7 @@
         </p:nvSpPr>
         <p:spPr>
           <a:xfrm>
-            <a:off x="311700" y="445025"/>
+            <a:off x="355200" y="292775"/>
             <a:ext cx="8520600" cy="572700"/>
           </a:xfrm>
           <a:prstGeom prst="rect">
@@ -8970,8 +9170,8 @@
         </p:nvSpPr>
         <p:spPr>
           <a:xfrm>
-            <a:off x="4080000" y="3864700"/>
-            <a:ext cx="4752300" cy="704100"/>
+            <a:off x="437125" y="865475"/>
+            <a:ext cx="7601100" cy="572700"/>
           </a:xfrm>
           <a:prstGeom prst="rect">
             <a:avLst/>
@@ -8993,7 +9193,13 @@
               <a:buNone/>
             </a:pPr>
             <a:r>
-              <a:t/>
+              <a:rPr lang="it">
+                <a:latin typeface="Comfortaa"/>
+                <a:ea typeface="Comfortaa"/>
+                <a:cs typeface="Comfortaa"/>
+                <a:sym typeface="Comfortaa"/>
+              </a:rPr>
+              <a:t>Precision, Recall and F1 per class.</a:t>
             </a:r>
             <a:endParaRPr/>
           </a:p>
@@ -9015,8 +9221,8 @@
         </p:blipFill>
         <p:spPr>
           <a:xfrm>
-            <a:off x="793438" y="1381500"/>
-            <a:ext cx="7557125" cy="2119425"/>
+            <a:off x="914437" y="1746400"/>
+            <a:ext cx="7315118" cy="2045663"/>
           </a:xfrm>
           <a:prstGeom prst="rect">
             <a:avLst/>
@@ -9032,89 +9238,6 @@
   <p:clrMapOvr>
     <a:masterClrMapping/>
   </p:clrMapOvr>
-  <p:timing>
-    <p:tnLst>
-      <p:par>
-        <p:cTn dur="indefinite" nodeType="tmRoot" restart="never">
-          <p:childTnLst>
-            <p:seq concurrent="1" nextAc="seek">
-              <p:cTn dur="indefinite" id="2" nodeType="mainSeq">
-                <p:childTnLst>
-                  <p:par>
-                    <p:cTn fill="hold">
-                      <p:stCondLst>
-                        <p:cond delay="indefinite"/>
-                      </p:stCondLst>
-                      <p:childTnLst>
-                        <p:par>
-                          <p:cTn fill="hold">
-                            <p:stCondLst>
-                              <p:cond delay="0"/>
-                            </p:stCondLst>
-                            <p:childTnLst>
-                              <p:par>
-                                <p:cTn fill="hold" nodeType="clickEffect" presetClass="entr" presetID="10" presetSubtype="0">
-                                  <p:stCondLst>
-                                    <p:cond delay="0"/>
-                                  </p:stCondLst>
-                                  <p:childTnLst>
-                                    <p:set>
-                                      <p:cBhvr>
-                                        <p:cTn dur="1" fill="hold">
-                                          <p:stCondLst>
-                                            <p:cond delay="0"/>
-                                          </p:stCondLst>
-                                        </p:cTn>
-                                        <p:tgtEl>
-                                          <p:spTgt spid="172"/>
-                                        </p:tgtEl>
-                                        <p:attrNameLst>
-                                          <p:attrName>style.visibility</p:attrName>
-                                        </p:attrNameLst>
-                                      </p:cBhvr>
-                                      <p:to>
-                                        <p:strVal val="visible"/>
-                                      </p:to>
-                                    </p:set>
-                                    <p:animEffect filter="fade" transition="in">
-                                      <p:cBhvr>
-                                        <p:cTn dur="1000"/>
-                                        <p:tgtEl>
-                                          <p:spTgt spid="172"/>
-                                        </p:tgtEl>
-                                      </p:cBhvr>
-                                    </p:animEffect>
-                                  </p:childTnLst>
-                                </p:cTn>
-                              </p:par>
-                            </p:childTnLst>
-                          </p:cTn>
-                        </p:par>
-                      </p:childTnLst>
-                    </p:cTn>
-                  </p:par>
-                </p:childTnLst>
-              </p:cTn>
-              <p:prevCondLst>
-                <p:cond evt="onPrev">
-                  <p:tgtEl>
-                    <p:sldTgt/>
-                  </p:tgtEl>
-                </p:cond>
-              </p:prevCondLst>
-              <p:nextCondLst>
-                <p:cond evt="onNext">
-                  <p:tgtEl>
-                    <p:sldTgt/>
-                  </p:tgtEl>
-                </p:cond>
-              </p:nextCondLst>
-            </p:seq>
-          </p:childTnLst>
-        </p:cTn>
-      </p:par>
-    </p:tnLst>
-  </p:timing>
 </p:sld>
 </file>
 
@@ -9124,7 +9247,7 @@
     <p:bg>
       <p:bgPr>
         <a:solidFill>
-          <a:srgbClr val="990000"/>
+          <a:srgbClr val="980000"/>
         </a:solidFill>
       </p:bgPr>
     </p:bg>
@@ -9152,6 +9275,306 @@
         </p:nvSpPr>
         <p:spPr>
           <a:xfrm>
+            <a:off x="311700" y="238400"/>
+            <a:ext cx="8520600" cy="572700"/>
+          </a:xfrm>
+          <a:prstGeom prst="rect">
+            <a:avLst/>
+          </a:prstGeom>
+        </p:spPr>
+        <p:txBody>
+          <a:bodyPr anchorCtr="0" anchor="t" bIns="91425" lIns="91425" spcFirstLastPara="1" rIns="91425" wrap="square" tIns="91425">
+            <a:normAutofit fontScale="90000"/>
+          </a:bodyPr>
+          <a:lstStyle/>
+          <a:p>
+            <a:pPr indent="0" lvl="0" marL="0" rtl="0" algn="l">
+              <a:spcBef>
+                <a:spcPts val="0"/>
+              </a:spcBef>
+              <a:spcAft>
+                <a:spcPts val="0"/>
+              </a:spcAft>
+              <a:buNone/>
+            </a:pPr>
+            <a:r>
+              <a:rPr lang="it" sz="3600">
+                <a:latin typeface="Comfortaa"/>
+                <a:ea typeface="Comfortaa"/>
+                <a:cs typeface="Comfortaa"/>
+                <a:sym typeface="Comfortaa"/>
+              </a:rPr>
+              <a:t>GraphAny performances on Task</a:t>
+            </a:r>
+            <a:endParaRPr/>
+          </a:p>
+        </p:txBody>
+      </p:sp>
+      <p:sp>
+        <p:nvSpPr>
+          <p:cNvPr id="178" name="Google Shape;178;p27"/>
+          <p:cNvSpPr txBox="1"/>
+          <p:nvPr>
+            <p:ph idx="1" type="body"/>
+          </p:nvPr>
+        </p:nvSpPr>
+        <p:spPr>
+          <a:xfrm>
+            <a:off x="431325" y="891500"/>
+            <a:ext cx="8520600" cy="504900"/>
+          </a:xfrm>
+          <a:prstGeom prst="rect">
+            <a:avLst/>
+          </a:prstGeom>
+        </p:spPr>
+        <p:txBody>
+          <a:bodyPr anchorCtr="0" anchor="t" bIns="91425" lIns="91425" spcFirstLastPara="1" rIns="91425" wrap="square" tIns="91425">
+            <a:normAutofit/>
+          </a:bodyPr>
+          <a:lstStyle/>
+          <a:p>
+            <a:pPr indent="0" lvl="0" marL="0" rtl="0" algn="l">
+              <a:spcBef>
+                <a:spcPts val="0"/>
+              </a:spcBef>
+              <a:spcAft>
+                <a:spcPts val="1200"/>
+              </a:spcAft>
+              <a:buNone/>
+            </a:pPr>
+            <a:r>
+              <a:rPr lang="it">
+                <a:latin typeface="Comfortaa"/>
+                <a:ea typeface="Comfortaa"/>
+                <a:cs typeface="Comfortaa"/>
+                <a:sym typeface="Comfortaa"/>
+              </a:rPr>
+              <a:t>Confusion Matrix.</a:t>
+            </a:r>
+            <a:endParaRPr/>
+          </a:p>
+        </p:txBody>
+      </p:sp>
+      <p:pic>
+        <p:nvPicPr>
+          <p:cNvPr id="179" name="Google Shape;179;p27"/>
+          <p:cNvPicPr preferRelativeResize="0"/>
+          <p:nvPr/>
+        </p:nvPicPr>
+        <p:blipFill>
+          <a:blip r:embed="rId3">
+            <a:alphaModFix/>
+          </a:blip>
+          <a:stretch>
+            <a:fillRect/>
+          </a:stretch>
+        </p:blipFill>
+        <p:spPr>
+          <a:xfrm>
+            <a:off x="2305500" y="1396400"/>
+            <a:ext cx="4467925" cy="3512225"/>
+          </a:xfrm>
+          <a:prstGeom prst="rect">
+            <a:avLst/>
+          </a:prstGeom>
+          <a:noFill/>
+          <a:ln>
+            <a:noFill/>
+          </a:ln>
+        </p:spPr>
+      </p:pic>
+    </p:spTree>
+  </p:cSld>
+  <p:clrMapOvr>
+    <a:masterClrMapping/>
+  </p:clrMapOvr>
+</p:sld>
+</file>
+
+<file path=ppt/slides/slide16.xml><?xml version="1.0" encoding="utf-8"?>
+<p:sld xmlns:a="http://schemas.openxmlformats.org/drawingml/2006/main" xmlns:r="http://schemas.openxmlformats.org/officeDocument/2006/relationships" xmlns:mc="http://schemas.openxmlformats.org/markup-compatibility/2006" xmlns:mv="urn:schemas-microsoft-com:mac:vml" xmlns:p="http://schemas.openxmlformats.org/presentationml/2006/main" xmlns:c="http://schemas.openxmlformats.org/drawingml/2006/chart" xmlns:dgm="http://schemas.openxmlformats.org/drawingml/2006/diagram" xmlns:o="urn:schemas-microsoft-com:office:office" xmlns:v="urn:schemas-microsoft-com:vml" xmlns:pvml="urn:schemas-microsoft-com:office:powerpoint" xmlns:com="http://schemas.openxmlformats.org/drawingml/2006/compatibility" xmlns:p14="http://schemas.microsoft.com/office/powerpoint/2010/main" xmlns:p15="http://schemas.microsoft.com/office/powerpoint/2012/main" xmlns:ahyp="http://schemas.microsoft.com/office/drawing/2018/hyperlinkcolor">
+  <p:cSld>
+    <p:bg>
+      <p:bgPr>
+        <a:solidFill>
+          <a:srgbClr val="980000"/>
+        </a:solidFill>
+      </p:bgPr>
+    </p:bg>
+    <p:spTree>
+      <p:nvGrpSpPr>
+        <p:cNvPr id="183" name="Shape 183"/>
+        <p:cNvGrpSpPr/>
+        <p:nvPr/>
+      </p:nvGrpSpPr>
+      <p:grpSpPr>
+        <a:xfrm>
+          <a:off x="0" y="0"/>
+          <a:ext cx="0" cy="0"/>
+          <a:chOff x="0" y="0"/>
+          <a:chExt cx="0" cy="0"/>
+        </a:xfrm>
+      </p:grpSpPr>
+      <p:sp>
+        <p:nvSpPr>
+          <p:cNvPr id="184" name="Google Shape;184;p28"/>
+          <p:cNvSpPr txBox="1"/>
+          <p:nvPr>
+            <p:ph type="title"/>
+          </p:nvPr>
+        </p:nvSpPr>
+        <p:spPr>
+          <a:xfrm>
+            <a:off x="311700" y="347150"/>
+            <a:ext cx="8520600" cy="572700"/>
+          </a:xfrm>
+          <a:prstGeom prst="rect">
+            <a:avLst/>
+          </a:prstGeom>
+        </p:spPr>
+        <p:txBody>
+          <a:bodyPr anchorCtr="0" anchor="t" bIns="91425" lIns="91425" spcFirstLastPara="1" rIns="91425" wrap="square" tIns="91425">
+            <a:normAutofit fontScale="90000"/>
+          </a:bodyPr>
+          <a:lstStyle/>
+          <a:p>
+            <a:pPr indent="0" lvl="0" marL="0" rtl="0" algn="l">
+              <a:spcBef>
+                <a:spcPts val="0"/>
+              </a:spcBef>
+              <a:spcAft>
+                <a:spcPts val="0"/>
+              </a:spcAft>
+              <a:buNone/>
+            </a:pPr>
+            <a:r>
+              <a:rPr lang="it" sz="3600">
+                <a:latin typeface="Comfortaa"/>
+                <a:ea typeface="Comfortaa"/>
+                <a:cs typeface="Comfortaa"/>
+                <a:sym typeface="Comfortaa"/>
+              </a:rPr>
+              <a:t>GraphAny performances on Task</a:t>
+            </a:r>
+            <a:endParaRPr/>
+          </a:p>
+        </p:txBody>
+      </p:sp>
+      <p:sp>
+        <p:nvSpPr>
+          <p:cNvPr id="185" name="Google Shape;185;p28"/>
+          <p:cNvSpPr txBox="1"/>
+          <p:nvPr>
+            <p:ph idx="1" type="body"/>
+          </p:nvPr>
+        </p:nvSpPr>
+        <p:spPr>
+          <a:xfrm>
+            <a:off x="311700" y="1103538"/>
+            <a:ext cx="8520600" cy="572700"/>
+          </a:xfrm>
+          <a:prstGeom prst="rect">
+            <a:avLst/>
+          </a:prstGeom>
+        </p:spPr>
+        <p:txBody>
+          <a:bodyPr anchorCtr="0" anchor="t" bIns="91425" lIns="91425" spcFirstLastPara="1" rIns="91425" wrap="square" tIns="91425">
+            <a:normAutofit/>
+          </a:bodyPr>
+          <a:lstStyle/>
+          <a:p>
+            <a:pPr indent="0" lvl="0" marL="0" rtl="0" algn="l">
+              <a:spcBef>
+                <a:spcPts val="0"/>
+              </a:spcBef>
+              <a:spcAft>
+                <a:spcPts val="1200"/>
+              </a:spcAft>
+              <a:buNone/>
+            </a:pPr>
+            <a:r>
+              <a:rPr lang="it">
+                <a:latin typeface="Comfortaa"/>
+                <a:ea typeface="Comfortaa"/>
+                <a:cs typeface="Comfortaa"/>
+                <a:sym typeface="Comfortaa"/>
+              </a:rPr>
+              <a:t>Cohen’s Kappa Score, Binary ROC-AUC and One-vs-Rest  ROC-AUC.</a:t>
+            </a:r>
+            <a:endParaRPr/>
+          </a:p>
+        </p:txBody>
+      </p:sp>
+      <p:pic>
+        <p:nvPicPr>
+          <p:cNvPr id="186" name="Google Shape;186;p28"/>
+          <p:cNvPicPr preferRelativeResize="0"/>
+          <p:nvPr/>
+        </p:nvPicPr>
+        <p:blipFill>
+          <a:blip r:embed="rId3">
+            <a:alphaModFix/>
+          </a:blip>
+          <a:stretch>
+            <a:fillRect/>
+          </a:stretch>
+        </p:blipFill>
+        <p:spPr>
+          <a:xfrm>
+            <a:off x="728725" y="1859925"/>
+            <a:ext cx="7461724" cy="2374175"/>
+          </a:xfrm>
+          <a:prstGeom prst="rect">
+            <a:avLst/>
+          </a:prstGeom>
+          <a:noFill/>
+          <a:ln>
+            <a:noFill/>
+          </a:ln>
+        </p:spPr>
+      </p:pic>
+    </p:spTree>
+  </p:cSld>
+  <p:clrMapOvr>
+    <a:masterClrMapping/>
+  </p:clrMapOvr>
+</p:sld>
+</file>
+
+<file path=ppt/slides/slide17.xml><?xml version="1.0" encoding="utf-8"?>
+<p:sld xmlns:a="http://schemas.openxmlformats.org/drawingml/2006/main" xmlns:r="http://schemas.openxmlformats.org/officeDocument/2006/relationships" xmlns:mc="http://schemas.openxmlformats.org/markup-compatibility/2006" xmlns:mv="urn:schemas-microsoft-com:mac:vml" xmlns:p="http://schemas.openxmlformats.org/presentationml/2006/main" xmlns:c="http://schemas.openxmlformats.org/drawingml/2006/chart" xmlns:dgm="http://schemas.openxmlformats.org/drawingml/2006/diagram" xmlns:o="urn:schemas-microsoft-com:office:office" xmlns:v="urn:schemas-microsoft-com:vml" xmlns:pvml="urn:schemas-microsoft-com:office:powerpoint" xmlns:com="http://schemas.openxmlformats.org/drawingml/2006/compatibility" xmlns:p14="http://schemas.microsoft.com/office/powerpoint/2010/main" xmlns:p15="http://schemas.microsoft.com/office/powerpoint/2012/main" xmlns:ahyp="http://schemas.microsoft.com/office/drawing/2018/hyperlinkcolor">
+  <p:cSld>
+    <p:bg>
+      <p:bgPr>
+        <a:solidFill>
+          <a:srgbClr val="990000"/>
+        </a:solidFill>
+      </p:bgPr>
+    </p:bg>
+    <p:spTree>
+      <p:nvGrpSpPr>
+        <p:cNvPr id="190" name="Shape 190"/>
+        <p:cNvGrpSpPr/>
+        <p:nvPr/>
+      </p:nvGrpSpPr>
+      <p:grpSpPr>
+        <a:xfrm>
+          <a:off x="0" y="0"/>
+          <a:ext cx="0" cy="0"/>
+          <a:chOff x="0" y="0"/>
+          <a:chExt cx="0" cy="0"/>
+        </a:xfrm>
+      </p:grpSpPr>
+      <p:sp>
+        <p:nvSpPr>
+          <p:cNvPr id="191" name="Google Shape;191;p29"/>
+          <p:cNvSpPr txBox="1"/>
+          <p:nvPr>
+            <p:ph type="title"/>
+          </p:nvPr>
+        </p:nvSpPr>
+        <p:spPr>
+          <a:xfrm>
             <a:off x="311700" y="445025"/>
             <a:ext cx="4260300" cy="2756400"/>
           </a:xfrm>
@@ -9267,7 +9690,7 @@
       </p:sp>
       <p:sp>
         <p:nvSpPr>
-          <p:cNvPr id="178" name="Google Shape;178;p27"/>
+          <p:cNvPr id="192" name="Google Shape;192;p29"/>
           <p:cNvSpPr txBox="1"/>
           <p:nvPr>
             <p:ph idx="1" type="body"/>
@@ -9306,7 +9729,7 @@
       </p:sp>
       <p:pic>
         <p:nvPicPr>
-          <p:cNvPr id="179" name="Google Shape;179;p27" title="maturation.png"/>
+          <p:cNvPr id="193" name="Google Shape;193;p29" title="maturation.png"/>
           <p:cNvPicPr preferRelativeResize="0"/>
           <p:nvPr/>
         </p:nvPicPr>
@@ -9340,7 +9763,7 @@
 </p:sld>
 </file>
 
-<file path=ppt/slides/slide16.xml><?xml version="1.0" encoding="utf-8"?>
+<file path=ppt/slides/slide18.xml><?xml version="1.0" encoding="utf-8"?>
 <p:sld xmlns:a="http://schemas.openxmlformats.org/drawingml/2006/main" xmlns:r="http://schemas.openxmlformats.org/officeDocument/2006/relationships" xmlns:mc="http://schemas.openxmlformats.org/markup-compatibility/2006" xmlns:mv="urn:schemas-microsoft-com:mac:vml" xmlns:p="http://schemas.openxmlformats.org/presentationml/2006/main" xmlns:c="http://schemas.openxmlformats.org/drawingml/2006/chart" xmlns:dgm="http://schemas.openxmlformats.org/drawingml/2006/diagram" xmlns:o="urn:schemas-microsoft-com:office:office" xmlns:v="urn:schemas-microsoft-com:vml" xmlns:pvml="urn:schemas-microsoft-com:office:powerpoint" xmlns:com="http://schemas.openxmlformats.org/drawingml/2006/compatibility" xmlns:p14="http://schemas.microsoft.com/office/powerpoint/2010/main" xmlns:p15="http://schemas.microsoft.com/office/powerpoint/2012/main" xmlns:ahyp="http://schemas.microsoft.com/office/drawing/2018/hyperlinkcolor">
   <p:cSld>
     <p:bg>
@@ -9352,7 +9775,7 @@
     </p:bg>
     <p:spTree>
       <p:nvGrpSpPr>
-        <p:cNvPr id="183" name="Shape 183"/>
+        <p:cNvPr id="197" name="Shape 197"/>
         <p:cNvGrpSpPr/>
         <p:nvPr/>
       </p:nvGrpSpPr>
@@ -9366,7 +9789,7 @@
       </p:grpSpPr>
       <p:sp>
         <p:nvSpPr>
-          <p:cNvPr id="184" name="Google Shape;184;p28"/>
+          <p:cNvPr id="198" name="Google Shape;198;p30"/>
           <p:cNvSpPr txBox="1"/>
           <p:nvPr>
             <p:ph type="title"/>
@@ -9411,7 +9834,7 @@
       </p:sp>
       <p:sp>
         <p:nvSpPr>
-          <p:cNvPr id="185" name="Google Shape;185;p28"/>
+          <p:cNvPr id="199" name="Google Shape;199;p30"/>
           <p:cNvSpPr txBox="1"/>
           <p:nvPr>
             <p:ph idx="1" type="body"/>
@@ -9464,7 +9887,7 @@
       </p:sp>
       <p:sp>
         <p:nvSpPr>
-          <p:cNvPr id="186" name="Google Shape;186;p28"/>
+          <p:cNvPr id="200" name="Google Shape;200;p30"/>
           <p:cNvSpPr txBox="1"/>
           <p:nvPr/>
         </p:nvSpPr>
@@ -9523,7 +9946,7 @@
       </p:sp>
       <p:pic>
         <p:nvPicPr>
-          <p:cNvPr id="187" name="Google Shape;187;p28" title="server-control.png"/>
+          <p:cNvPr id="201" name="Google Shape;201;p30" title="server-control.png"/>
           <p:cNvPicPr preferRelativeResize="0"/>
           <p:nvPr/>
         </p:nvPicPr>
@@ -9551,7 +9974,7 @@
       </p:pic>
       <p:sp>
         <p:nvSpPr>
-          <p:cNvPr id="188" name="Google Shape;188;p28"/>
+          <p:cNvPr id="202" name="Google Shape;202;p30"/>
           <p:cNvSpPr txBox="1"/>
           <p:nvPr/>
         </p:nvSpPr>
@@ -9633,7 +10056,7 @@
       </p:sp>
       <p:pic>
         <p:nvPicPr>
-          <p:cNvPr id="189" name="Google Shape;189;p28" title="right-arrow.png"/>
+          <p:cNvPr id="203" name="Google Shape;203;p30" title="right-arrow.png"/>
           <p:cNvPicPr preferRelativeResize="0"/>
           <p:nvPr/>
         </p:nvPicPr>
@@ -9698,7 +10121,7 @@
                                           </p:stCondLst>
                                         </p:cTn>
                                         <p:tgtEl>
-                                          <p:spTgt spid="185"/>
+                                          <p:spTgt spid="199"/>
                                         </p:tgtEl>
                                         <p:attrNameLst>
                                           <p:attrName>style.visibility</p:attrName>
@@ -9712,7 +10135,7 @@
                                       <p:cBhvr>
                                         <p:cTn dur="1000"/>
                                         <p:tgtEl>
-                                          <p:spTgt spid="185"/>
+                                          <p:spTgt spid="199"/>
                                         </p:tgtEl>
                                       </p:cBhvr>
                                     </p:animEffect>
@@ -9733,7 +10156,7 @@
                                           </p:stCondLst>
                                         </p:cTn>
                                         <p:tgtEl>
-                                          <p:spTgt spid="187"/>
+                                          <p:spTgt spid="201"/>
                                         </p:tgtEl>
                                         <p:attrNameLst>
                                           <p:attrName>style.visibility</p:attrName>
@@ -9747,7 +10170,7 @@
                                       <p:cBhvr>
                                         <p:cTn dur="1000"/>
                                         <p:tgtEl>
-                                          <p:spTgt spid="187"/>
+                                          <p:spTgt spid="201"/>
                                         </p:tgtEl>
                                       </p:cBhvr>
                                     </p:animEffect>
@@ -9786,7 +10209,7 @@
                                           </p:stCondLst>
                                         </p:cTn>
                                         <p:tgtEl>
-                                          <p:spTgt spid="186"/>
+                                          <p:spTgt spid="200"/>
                                         </p:tgtEl>
                                         <p:attrNameLst>
                                           <p:attrName>style.visibility</p:attrName>
@@ -9800,7 +10223,7 @@
                                       <p:cBhvr>
                                         <p:cTn dur="1000"/>
                                         <p:tgtEl>
-                                          <p:spTgt spid="186"/>
+                                          <p:spTgt spid="200"/>
                                         </p:tgtEl>
                                       </p:cBhvr>
                                     </p:animEffect>
@@ -9839,7 +10262,7 @@
                                           </p:stCondLst>
                                         </p:cTn>
                                         <p:tgtEl>
-                                          <p:spTgt spid="189"/>
+                                          <p:spTgt spid="203"/>
                                         </p:tgtEl>
                                         <p:attrNameLst>
                                           <p:attrName>style.visibility</p:attrName>
@@ -9884,7 +10307,7 @@
                                           </p:stCondLst>
                                         </p:cTn>
                                         <p:tgtEl>
-                                          <p:spTgt spid="188"/>
+                                          <p:spTgt spid="202"/>
                                         </p:tgtEl>
                                         <p:attrNameLst>
                                           <p:attrName>style.visibility</p:attrName>
@@ -9898,7 +10321,7 @@
                                       <p:cBhvr>
                                         <p:cTn dur="1000"/>
                                         <p:tgtEl>
-                                          <p:spTgt spid="188"/>
+                                          <p:spTgt spid="202"/>
                                         </p:tgtEl>
                                       </p:cBhvr>
                                     </p:animEffect>
@@ -9936,7 +10359,7 @@
 </p:sld>
 </file>
 
-<file path=ppt/slides/slide17.xml><?xml version="1.0" encoding="utf-8"?>
+<file path=ppt/slides/slide19.xml><?xml version="1.0" encoding="utf-8"?>
 <p:sld xmlns:a="http://schemas.openxmlformats.org/drawingml/2006/main" xmlns:r="http://schemas.openxmlformats.org/officeDocument/2006/relationships" xmlns:mc="http://schemas.openxmlformats.org/markup-compatibility/2006" xmlns:mv="urn:schemas-microsoft-com:mac:vml" xmlns:p="http://schemas.openxmlformats.org/presentationml/2006/main" xmlns:c="http://schemas.openxmlformats.org/drawingml/2006/chart" xmlns:dgm="http://schemas.openxmlformats.org/drawingml/2006/diagram" xmlns:o="urn:schemas-microsoft-com:office:office" xmlns:v="urn:schemas-microsoft-com:vml" xmlns:pvml="urn:schemas-microsoft-com:office:powerpoint" xmlns:com="http://schemas.openxmlformats.org/drawingml/2006/compatibility" xmlns:p14="http://schemas.microsoft.com/office/powerpoint/2010/main" xmlns:p15="http://schemas.microsoft.com/office/powerpoint/2012/main" xmlns:ahyp="http://schemas.microsoft.com/office/drawing/2018/hyperlinkcolor">
   <p:cSld>
     <p:bg>
@@ -9948,7 +10371,7 @@
     </p:bg>
     <p:spTree>
       <p:nvGrpSpPr>
-        <p:cNvPr id="193" name="Shape 193"/>
+        <p:cNvPr id="207" name="Shape 207"/>
         <p:cNvGrpSpPr/>
         <p:nvPr/>
       </p:nvGrpSpPr>
@@ -9962,7 +10385,7 @@
       </p:grpSpPr>
       <p:sp>
         <p:nvSpPr>
-          <p:cNvPr id="194" name="Google Shape;194;p29"/>
+          <p:cNvPr id="208" name="Google Shape;208;p31"/>
           <p:cNvSpPr txBox="1"/>
           <p:nvPr>
             <p:ph type="title"/>
@@ -10034,7 +10457,7 @@
       </p:sp>
       <p:sp>
         <p:nvSpPr>
-          <p:cNvPr id="195" name="Google Shape;195;p29"/>
+          <p:cNvPr id="209" name="Google Shape;209;p31"/>
           <p:cNvSpPr txBox="1"/>
           <p:nvPr>
             <p:ph idx="1" type="body"/>
@@ -10073,7 +10496,7 @@
       </p:sp>
       <p:pic>
         <p:nvPicPr>
-          <p:cNvPr id="196" name="Google Shape;196;p29" title="chatbot.png"/>
+          <p:cNvPr id="210" name="Google Shape;210;p31" title="chatbot.png"/>
           <p:cNvPicPr preferRelativeResize="0"/>
           <p:nvPr/>
         </p:nvPicPr>

</xml_diff>